<commit_message>
+escalabilidad pto 4 inventarios
</commit_message>
<xml_diff>
--- a/08_inventarios/ejercicios/io2021_clase23_inventarios_ejercicio4.pptx
+++ b/08_inventarios/ejercicios/io2021_clase23_inventarios_ejercicio4.pptx
@@ -5,7 +5,7 @@
     <p:sldMasterId id="2147483654" r:id="rId1"/>
   </p:sldMasterIdLst>
   <p:notesMasterIdLst>
-    <p:notesMasterId r:id="rId16"/>
+    <p:notesMasterId r:id="rId17"/>
   </p:notesMasterIdLst>
   <p:sldIdLst>
     <p:sldId id="256" r:id="rId2"/>
@@ -22,20 +22,21 @@
     <p:sldId id="267" r:id="rId13"/>
     <p:sldId id="268" r:id="rId14"/>
     <p:sldId id="269" r:id="rId15"/>
+    <p:sldId id="270" r:id="rId16"/>
   </p:sldIdLst>
   <p:sldSz cx="9144000" cy="5143500" type="screen16x9"/>
   <p:notesSz cx="6858000" cy="9144000"/>
   <p:embeddedFontLst>
     <p:embeddedFont>
       <p:font typeface="Cambria Math" panose="02040503050406030204" pitchFamily="18" charset="0"/>
-      <p:regular r:id="rId17"/>
+      <p:regular r:id="rId18"/>
     </p:embeddedFont>
     <p:embeddedFont>
       <p:font typeface="Helvetica Neue" panose="020B0604020202020204" charset="0"/>
-      <p:regular r:id="rId18"/>
-      <p:bold r:id="rId19"/>
-      <p:italic r:id="rId20"/>
-      <p:boldItalic r:id="rId21"/>
+      <p:regular r:id="rId19"/>
+      <p:bold r:id="rId20"/>
+      <p:italic r:id="rId21"/>
+      <p:boldItalic r:id="rId22"/>
     </p:embeddedFont>
   </p:embeddedFontLst>
   <p:defaultTextStyle>
@@ -1605,6 +1606,134 @@
     <p:extLst>
       <p:ext uri="{BB962C8B-B14F-4D97-AF65-F5344CB8AC3E}">
         <p14:creationId xmlns:p14="http://schemas.microsoft.com/office/powerpoint/2010/main" val="3937846125"/>
+      </p:ext>
+    </p:extLst>
+  </p:cSld>
+  <p:clrMapOvr>
+    <a:masterClrMapping/>
+  </p:clrMapOvr>
+</p:notes>
+</file>
+
+<file path=ppt/notesSlides/notesSlide15.xml><?xml version="1.0" encoding="utf-8"?>
+<p:notes xmlns:a="http://schemas.openxmlformats.org/drawingml/2006/main" xmlns:r="http://schemas.openxmlformats.org/officeDocument/2006/relationships" xmlns:p="http://schemas.openxmlformats.org/presentationml/2006/main" showMasterSp="0" showMasterPhAnim="0">
+  <p:cSld>
+    <p:spTree>
+      <p:nvGrpSpPr>
+        <p:cNvPr id="1" name="Shape 39"/>
+        <p:cNvGrpSpPr/>
+        <p:nvPr/>
+      </p:nvGrpSpPr>
+      <p:grpSpPr>
+        <a:xfrm>
+          <a:off x="0" y="0"/>
+          <a:ext cx="0" cy="0"/>
+          <a:chOff x="0" y="0"/>
+          <a:chExt cx="0" cy="0"/>
+        </a:xfrm>
+      </p:grpSpPr>
+      <p:sp>
+        <p:nvSpPr>
+          <p:cNvPr id="40" name="Google Shape;40;p1:notes"/>
+          <p:cNvSpPr>
+            <a:spLocks noGrp="1" noRot="1" noChangeAspect="1"/>
+          </p:cNvSpPr>
+          <p:nvPr>
+            <p:ph type="sldImg" idx="2"/>
+          </p:nvPr>
+        </p:nvSpPr>
+        <p:spPr>
+          <a:xfrm>
+            <a:off x="381000" y="685800"/>
+            <a:ext cx="6096000" cy="3429000"/>
+          </a:xfrm>
+          <a:custGeom>
+            <a:avLst/>
+            <a:gdLst/>
+            <a:ahLst/>
+            <a:cxnLst/>
+            <a:rect l="l" t="t" r="r" b="b"/>
+            <a:pathLst>
+              <a:path w="120000" h="120000" extrusionOk="0">
+                <a:moveTo>
+                  <a:pt x="0" y="0"/>
+                </a:moveTo>
+                <a:lnTo>
+                  <a:pt x="120000" y="0"/>
+                </a:lnTo>
+                <a:lnTo>
+                  <a:pt x="120000" y="120000"/>
+                </a:lnTo>
+                <a:lnTo>
+                  <a:pt x="0" y="120000"/>
+                </a:lnTo>
+                <a:close/>
+              </a:path>
+            </a:pathLst>
+          </a:custGeom>
+          <a:noFill/>
+          <a:ln w="9525" cap="flat" cmpd="sng">
+            <a:solidFill>
+              <a:srgbClr val="000000"/>
+            </a:solidFill>
+            <a:prstDash val="solid"/>
+            <a:round/>
+            <a:headEnd type="none" w="sm" len="sm"/>
+            <a:tailEnd type="none" w="sm" len="sm"/>
+          </a:ln>
+        </p:spPr>
+      </p:sp>
+      <p:sp>
+        <p:nvSpPr>
+          <p:cNvPr id="41" name="Google Shape;41;p1:notes"/>
+          <p:cNvSpPr txBox="1">
+            <a:spLocks noGrp="1"/>
+          </p:cNvSpPr>
+          <p:nvPr>
+            <p:ph type="body" idx="1"/>
+          </p:nvPr>
+        </p:nvSpPr>
+        <p:spPr>
+          <a:xfrm>
+            <a:off x="685800" y="4343400"/>
+            <a:ext cx="5486400" cy="4114800"/>
+          </a:xfrm>
+          <a:prstGeom prst="rect">
+            <a:avLst/>
+          </a:prstGeom>
+          <a:noFill/>
+          <a:ln>
+            <a:noFill/>
+          </a:ln>
+        </p:spPr>
+        <p:txBody>
+          <a:bodyPr spcFirstLastPara="1" wrap="square" lIns="91425" tIns="91425" rIns="91425" bIns="91425" anchor="t" anchorCtr="0">
+            <a:noAutofit/>
+          </a:bodyPr>
+          <a:lstStyle/>
+          <a:p>
+            <a:pPr marL="0" marR="0" lvl="0" indent="0" algn="l" rtl="0">
+              <a:lnSpc>
+                <a:spcPct val="100000"/>
+              </a:lnSpc>
+              <a:spcBef>
+                <a:spcPts val="0"/>
+              </a:spcBef>
+              <a:spcAft>
+                <a:spcPts val="0"/>
+              </a:spcAft>
+              <a:buSzPts val="1400"/>
+              <a:buFont typeface="Arial"/>
+              <a:buNone/>
+            </a:pPr>
+            <a:endParaRPr sz="1100" b="0" i="0" u="none" strike="noStrike" cap="none"/>
+          </a:p>
+        </p:txBody>
+      </p:sp>
+    </p:spTree>
+    <p:extLst>
+      <p:ext uri="{BB962C8B-B14F-4D97-AF65-F5344CB8AC3E}">
+        <p14:creationId xmlns:p14="http://schemas.microsoft.com/office/powerpoint/2010/main" val="3258180078"/>
       </p:ext>
     </p:extLst>
   </p:cSld>
@@ -7066,73 +7195,6 @@
           <a:chExt cx="0" cy="0"/>
         </a:xfrm>
       </p:grpSpPr>
-      <p:sp>
-        <p:nvSpPr>
-          <p:cNvPr id="43" name="Google Shape;43;p9"/>
-          <p:cNvSpPr txBox="1">
-            <a:spLocks noGrp="1"/>
-          </p:cNvSpPr>
-          <p:nvPr>
-            <p:ph type="title"/>
-          </p:nvPr>
-        </p:nvSpPr>
-        <p:spPr>
-          <a:xfrm>
-            <a:off x="0" y="0"/>
-            <a:ext cx="3409122" cy="616226"/>
-          </a:xfrm>
-          <a:prstGeom prst="rect">
-            <a:avLst/>
-          </a:prstGeom>
-          <a:noFill/>
-          <a:ln>
-            <a:noFill/>
-          </a:ln>
-        </p:spPr>
-        <p:txBody>
-          <a:bodyPr spcFirstLastPara="1" wrap="square" lIns="91425" tIns="91425" rIns="91425" bIns="91425" anchor="b" anchorCtr="0">
-            <a:noAutofit/>
-          </a:bodyPr>
-          <a:lstStyle/>
-          <a:p>
-            <a:pPr marL="0" marR="0" lvl="0" indent="0" algn="l" rtl="0">
-              <a:lnSpc>
-                <a:spcPct val="100000"/>
-              </a:lnSpc>
-              <a:spcBef>
-                <a:spcPts val="0"/>
-              </a:spcBef>
-              <a:spcAft>
-                <a:spcPts val="0"/>
-              </a:spcAft>
-              <a:buClr>
-                <a:schemeClr val="lt1"/>
-              </a:buClr>
-              <a:buSzPts val="1400"/>
-              <a:buFont typeface="Arial"/>
-              <a:buNone/>
-            </a:pPr>
-            <a:r>
-              <a:rPr lang="es-AR" sz="3200" dirty="0">
-                <a:latin typeface="Helvetica Neue"/>
-                <a:ea typeface="Helvetica Neue"/>
-                <a:cs typeface="Helvetica Neue"/>
-                <a:sym typeface="Helvetica Neue"/>
-              </a:rPr>
-              <a:t>Visualización</a:t>
-            </a:r>
-            <a:endParaRPr sz="3200" i="0" u="none" strike="noStrike" cap="none" dirty="0">
-              <a:solidFill>
-                <a:schemeClr val="lt1"/>
-              </a:solidFill>
-              <a:latin typeface="Helvetica Neue"/>
-              <a:ea typeface="Helvetica Neue"/>
-              <a:cs typeface="Helvetica Neue"/>
-              <a:sym typeface="Helvetica Neue"/>
-            </a:endParaRPr>
-          </a:p>
-        </p:txBody>
-      </p:sp>
       <p:cxnSp>
         <p:nvCxnSpPr>
           <p:cNvPr id="7" name="Conector recto 6">
@@ -11179,73 +11241,6 @@
           <a:chExt cx="0" cy="0"/>
         </a:xfrm>
       </p:grpSpPr>
-      <p:sp>
-        <p:nvSpPr>
-          <p:cNvPr id="43" name="Google Shape;43;p9"/>
-          <p:cNvSpPr txBox="1">
-            <a:spLocks noGrp="1"/>
-          </p:cNvSpPr>
-          <p:nvPr>
-            <p:ph type="title"/>
-          </p:nvPr>
-        </p:nvSpPr>
-        <p:spPr>
-          <a:xfrm>
-            <a:off x="0" y="0"/>
-            <a:ext cx="3409122" cy="616226"/>
-          </a:xfrm>
-          <a:prstGeom prst="rect">
-            <a:avLst/>
-          </a:prstGeom>
-          <a:noFill/>
-          <a:ln>
-            <a:noFill/>
-          </a:ln>
-        </p:spPr>
-        <p:txBody>
-          <a:bodyPr spcFirstLastPara="1" wrap="square" lIns="91425" tIns="91425" rIns="91425" bIns="91425" anchor="b" anchorCtr="0">
-            <a:noAutofit/>
-          </a:bodyPr>
-          <a:lstStyle/>
-          <a:p>
-            <a:pPr marL="0" marR="0" lvl="0" indent="0" algn="l" rtl="0">
-              <a:lnSpc>
-                <a:spcPct val="100000"/>
-              </a:lnSpc>
-              <a:spcBef>
-                <a:spcPts val="0"/>
-              </a:spcBef>
-              <a:spcAft>
-                <a:spcPts val="0"/>
-              </a:spcAft>
-              <a:buClr>
-                <a:schemeClr val="lt1"/>
-              </a:buClr>
-              <a:buSzPts val="1400"/>
-              <a:buFont typeface="Arial"/>
-              <a:buNone/>
-            </a:pPr>
-            <a:r>
-              <a:rPr lang="es-AR" sz="3200" dirty="0">
-                <a:latin typeface="Helvetica Neue"/>
-                <a:ea typeface="Helvetica Neue"/>
-                <a:cs typeface="Helvetica Neue"/>
-                <a:sym typeface="Helvetica Neue"/>
-              </a:rPr>
-              <a:t>Visualización</a:t>
-            </a:r>
-            <a:endParaRPr sz="3200" i="0" u="none" strike="noStrike" cap="none" dirty="0">
-              <a:solidFill>
-                <a:schemeClr val="lt1"/>
-              </a:solidFill>
-              <a:latin typeface="Helvetica Neue"/>
-              <a:ea typeface="Helvetica Neue"/>
-              <a:cs typeface="Helvetica Neue"/>
-              <a:sym typeface="Helvetica Neue"/>
-            </a:endParaRPr>
-          </a:p>
-        </p:txBody>
-      </p:sp>
       <p:cxnSp>
         <p:nvCxnSpPr>
           <p:cNvPr id="7" name="Conector recto 6">
@@ -15605,73 +15600,6 @@
           <a:chExt cx="0" cy="0"/>
         </a:xfrm>
       </p:grpSpPr>
-      <p:sp>
-        <p:nvSpPr>
-          <p:cNvPr id="43" name="Google Shape;43;p9"/>
-          <p:cNvSpPr txBox="1">
-            <a:spLocks noGrp="1"/>
-          </p:cNvSpPr>
-          <p:nvPr>
-            <p:ph type="title"/>
-          </p:nvPr>
-        </p:nvSpPr>
-        <p:spPr>
-          <a:xfrm>
-            <a:off x="0" y="0"/>
-            <a:ext cx="3409122" cy="616226"/>
-          </a:xfrm>
-          <a:prstGeom prst="rect">
-            <a:avLst/>
-          </a:prstGeom>
-          <a:noFill/>
-          <a:ln>
-            <a:noFill/>
-          </a:ln>
-        </p:spPr>
-        <p:txBody>
-          <a:bodyPr spcFirstLastPara="1" wrap="square" lIns="91425" tIns="91425" rIns="91425" bIns="91425" anchor="b" anchorCtr="0">
-            <a:noAutofit/>
-          </a:bodyPr>
-          <a:lstStyle/>
-          <a:p>
-            <a:pPr marL="0" marR="0" lvl="0" indent="0" algn="l" rtl="0">
-              <a:lnSpc>
-                <a:spcPct val="100000"/>
-              </a:lnSpc>
-              <a:spcBef>
-                <a:spcPts val="0"/>
-              </a:spcBef>
-              <a:spcAft>
-                <a:spcPts val="0"/>
-              </a:spcAft>
-              <a:buClr>
-                <a:schemeClr val="lt1"/>
-              </a:buClr>
-              <a:buSzPts val="1400"/>
-              <a:buFont typeface="Arial"/>
-              <a:buNone/>
-            </a:pPr>
-            <a:r>
-              <a:rPr lang="es-AR" sz="3200" dirty="0">
-                <a:latin typeface="Helvetica Neue"/>
-                <a:ea typeface="Helvetica Neue"/>
-                <a:cs typeface="Helvetica Neue"/>
-                <a:sym typeface="Helvetica Neue"/>
-              </a:rPr>
-              <a:t>Visualización</a:t>
-            </a:r>
-            <a:endParaRPr sz="3200" i="0" u="none" strike="noStrike" cap="none" dirty="0">
-              <a:solidFill>
-                <a:schemeClr val="lt1"/>
-              </a:solidFill>
-              <a:latin typeface="Helvetica Neue"/>
-              <a:ea typeface="Helvetica Neue"/>
-              <a:cs typeface="Helvetica Neue"/>
-              <a:sym typeface="Helvetica Neue"/>
-            </a:endParaRPr>
-          </a:p>
-        </p:txBody>
-      </p:sp>
       <p:cxnSp>
         <p:nvCxnSpPr>
           <p:cNvPr id="7" name="Conector recto 6">
@@ -25240,6 +25168,747 @@
 </p:sld>
 </file>
 
+<file path=ppt/slides/slide15.xml><?xml version="1.0" encoding="utf-8"?>
+<p:sld xmlns:a="http://schemas.openxmlformats.org/drawingml/2006/main" xmlns:r="http://schemas.openxmlformats.org/officeDocument/2006/relationships" xmlns:p="http://schemas.openxmlformats.org/presentationml/2006/main">
+  <p:cSld>
+    <p:spTree>
+      <p:nvGrpSpPr>
+        <p:cNvPr id="1" name="Shape 42"/>
+        <p:cNvGrpSpPr/>
+        <p:nvPr/>
+      </p:nvGrpSpPr>
+      <p:grpSpPr>
+        <a:xfrm>
+          <a:off x="0" y="0"/>
+          <a:ext cx="0" cy="0"/>
+          <a:chOff x="0" y="0"/>
+          <a:chExt cx="0" cy="0"/>
+        </a:xfrm>
+      </p:grpSpPr>
+      <p:sp>
+        <p:nvSpPr>
+          <p:cNvPr id="43" name="Google Shape;43;p9"/>
+          <p:cNvSpPr txBox="1">
+            <a:spLocks noGrp="1"/>
+          </p:cNvSpPr>
+          <p:nvPr>
+            <p:ph type="title"/>
+          </p:nvPr>
+        </p:nvSpPr>
+        <p:spPr>
+          <a:prstGeom prst="rect">
+            <a:avLst/>
+          </a:prstGeom>
+          <a:noFill/>
+          <a:ln>
+            <a:noFill/>
+          </a:ln>
+        </p:spPr>
+        <p:txBody>
+          <a:bodyPr spcFirstLastPara="1" wrap="square" lIns="91425" tIns="91425" rIns="91425" bIns="91425" anchor="b" anchorCtr="0">
+            <a:noAutofit/>
+          </a:bodyPr>
+          <a:lstStyle/>
+          <a:p>
+            <a:pPr marL="0" marR="0" lvl="0" indent="0" algn="l" rtl="0">
+              <a:lnSpc>
+                <a:spcPct val="100000"/>
+              </a:lnSpc>
+              <a:spcBef>
+                <a:spcPts val="0"/>
+              </a:spcBef>
+              <a:spcAft>
+                <a:spcPts val="0"/>
+              </a:spcAft>
+              <a:buClr>
+                <a:schemeClr val="lt1"/>
+              </a:buClr>
+              <a:buSzPts val="1400"/>
+              <a:buFont typeface="Arial"/>
+              <a:buNone/>
+            </a:pPr>
+            <a:r>
+              <a:rPr lang="es-ES" sz="3200" dirty="0">
+                <a:latin typeface="Helvetica Neue"/>
+                <a:ea typeface="Helvetica Neue"/>
+                <a:cs typeface="Helvetica Neue"/>
+                <a:sym typeface="Helvetica Neue"/>
+              </a:rPr>
+              <a:t>¿Cómo escalo el problema en Python?</a:t>
+            </a:r>
+            <a:endParaRPr sz="3200" i="0" u="none" strike="noStrike" cap="none" dirty="0">
+              <a:solidFill>
+                <a:schemeClr val="lt1"/>
+              </a:solidFill>
+              <a:latin typeface="Helvetica Neue"/>
+              <a:ea typeface="Helvetica Neue"/>
+              <a:cs typeface="Helvetica Neue"/>
+              <a:sym typeface="Helvetica Neue"/>
+            </a:endParaRPr>
+          </a:p>
+        </p:txBody>
+      </p:sp>
+      <p:pic>
+        <p:nvPicPr>
+          <p:cNvPr id="1026" name="Picture 2" descr="logo">
+            <a:extLst>
+              <a:ext uri="{FF2B5EF4-FFF2-40B4-BE49-F238E27FC236}">
+                <a16:creationId xmlns:a16="http://schemas.microsoft.com/office/drawing/2014/main" id="{988ABE9D-FF45-45EC-9004-0ECE2670901B}"/>
+              </a:ext>
+            </a:extLst>
+          </p:cNvPr>
+          <p:cNvPicPr>
+            <a:picLocks noChangeAspect="1" noChangeArrowheads="1"/>
+          </p:cNvPicPr>
+          <p:nvPr/>
+        </p:nvPicPr>
+        <p:blipFill>
+          <a:blip r:embed="rId3">
+            <a:extLst>
+              <a:ext uri="{28A0092B-C50C-407E-A947-70E740481C1C}">
+                <a14:useLocalDpi xmlns:a14="http://schemas.microsoft.com/office/drawing/2010/main" val="0"/>
+              </a:ext>
+            </a:extLst>
+          </a:blip>
+          <a:srcRect/>
+          <a:stretch>
+            <a:fillRect/>
+          </a:stretch>
+        </p:blipFill>
+        <p:spPr bwMode="auto">
+          <a:xfrm>
+            <a:off x="243254" y="1294303"/>
+            <a:ext cx="750323" cy="701552"/>
+          </a:xfrm>
+          <a:prstGeom prst="rect">
+            <a:avLst/>
+          </a:prstGeom>
+          <a:noFill/>
+          <a:extLst>
+            <a:ext uri="{909E8E84-426E-40DD-AFC4-6F175D3DCCD1}">
+              <a14:hiddenFill xmlns:a14="http://schemas.microsoft.com/office/drawing/2010/main">
+                <a:solidFill>
+                  <a:srgbClr val="FFFFFF"/>
+                </a:solidFill>
+              </a14:hiddenFill>
+            </a:ext>
+          </a:extLst>
+        </p:spPr>
+      </p:pic>
+      <p:sp>
+        <p:nvSpPr>
+          <p:cNvPr id="2" name="CuadroTexto 1">
+            <a:extLst>
+              <a:ext uri="{FF2B5EF4-FFF2-40B4-BE49-F238E27FC236}">
+                <a16:creationId xmlns:a16="http://schemas.microsoft.com/office/drawing/2014/main" id="{9A05D48B-C27C-4AB9-98E0-4458A7F9EDEC}"/>
+              </a:ext>
+            </a:extLst>
+          </p:cNvPr>
+          <p:cNvSpPr txBox="1"/>
+          <p:nvPr/>
+        </p:nvSpPr>
+        <p:spPr>
+          <a:xfrm>
+            <a:off x="993577" y="1491190"/>
+            <a:ext cx="3174267" cy="3970318"/>
+          </a:xfrm>
+          <a:prstGeom prst="rect">
+            <a:avLst/>
+          </a:prstGeom>
+          <a:noFill/>
+        </p:spPr>
+        <p:txBody>
+          <a:bodyPr wrap="none" rtlCol="0">
+            <a:spAutoFit/>
+          </a:bodyPr>
+          <a:lstStyle/>
+          <a:p>
+            <a:r>
+              <a:rPr lang="es-ES" b="1" dirty="0" err="1"/>
+              <a:t>scipy.optimize</a:t>
+            </a:r>
+            <a:endParaRPr lang="es-ES" b="1" dirty="0"/>
+          </a:p>
+          <a:p>
+            <a:endParaRPr lang="es-ES" dirty="0"/>
+          </a:p>
+          <a:p>
+            <a:pPr marL="285750" indent="-285750">
+              <a:buFont typeface="Arial" panose="020B0604020202020204" pitchFamily="34" charset="0"/>
+              <a:buChar char="•"/>
+            </a:pPr>
+            <a:r>
+              <a:rPr lang="es-ES" u="sng" dirty="0">
+                <a:solidFill>
+                  <a:srgbClr val="FF0000"/>
+                </a:solidFill>
+              </a:rPr>
+              <a:t>Optimización multivariada local:</a:t>
+            </a:r>
+          </a:p>
+          <a:p>
+            <a:r>
+              <a:rPr lang="es-ES" dirty="0" err="1">
+                <a:solidFill>
+                  <a:srgbClr val="FF0000"/>
+                </a:solidFill>
+              </a:rPr>
+              <a:t>scipy.optimize.minimize</a:t>
+            </a:r>
+            <a:r>
+              <a:rPr lang="es-ES" dirty="0">
+                <a:solidFill>
+                  <a:srgbClr val="FF0000"/>
+                </a:solidFill>
+              </a:rPr>
+              <a:t>(.)</a:t>
+            </a:r>
+          </a:p>
+          <a:p>
+            <a:endParaRPr lang="es-ES" dirty="0"/>
+          </a:p>
+          <a:p>
+            <a:r>
+              <a:rPr lang="es-AR" dirty="0"/>
+              <a:t>res = </a:t>
+            </a:r>
+            <a:r>
+              <a:rPr lang="es-AR" dirty="0" err="1"/>
+              <a:t>scipy.optimize.minimize</a:t>
+            </a:r>
+            <a:r>
+              <a:rPr lang="es-AR" dirty="0"/>
+              <a:t>(</a:t>
+            </a:r>
+            <a:r>
+              <a:rPr lang="es-AR" dirty="0" err="1"/>
+              <a:t>fun</a:t>
+            </a:r>
+            <a:r>
+              <a:rPr lang="es-AR" dirty="0"/>
+              <a:t>, x0)</a:t>
+            </a:r>
+          </a:p>
+          <a:p>
+            <a:r>
+              <a:rPr lang="es-AR" dirty="0" err="1"/>
+              <a:t>res.fun</a:t>
+            </a:r>
+            <a:r>
+              <a:rPr lang="es-AR" dirty="0"/>
+              <a:t> -&gt; valor </a:t>
+            </a:r>
+            <a:r>
+              <a:rPr lang="es-ES" dirty="0"/>
+              <a:t>óptimo</a:t>
+            </a:r>
+          </a:p>
+          <a:p>
+            <a:r>
+              <a:rPr lang="es-ES" dirty="0" err="1"/>
+              <a:t>res.x</a:t>
+            </a:r>
+            <a:r>
+              <a:rPr lang="es-ES" dirty="0"/>
+              <a:t> -</a:t>
+            </a:r>
+            <a:r>
+              <a:rPr lang="en-US" dirty="0"/>
+              <a:t>&gt; </a:t>
+            </a:r>
+            <a:r>
+              <a:rPr lang="es-ES" dirty="0"/>
+              <a:t>x del valor óptimo</a:t>
+            </a:r>
+          </a:p>
+          <a:p>
+            <a:endParaRPr lang="es-ES" dirty="0"/>
+          </a:p>
+          <a:p>
+            <a:endParaRPr lang="es-ES" dirty="0"/>
+          </a:p>
+          <a:p>
+            <a:pPr marL="285750" indent="-285750">
+              <a:buFont typeface="Arial" panose="020B0604020202020204" pitchFamily="34" charset="0"/>
+              <a:buChar char="•"/>
+            </a:pPr>
+            <a:r>
+              <a:rPr lang="es-ES" u="sng" dirty="0"/>
+              <a:t>Optimización metaheurística:</a:t>
+            </a:r>
+          </a:p>
+          <a:p>
+            <a:r>
+              <a:rPr lang="es-ES" dirty="0" err="1"/>
+              <a:t>scipy.optimize.differential_evolution</a:t>
+            </a:r>
+            <a:r>
+              <a:rPr lang="es-ES" dirty="0"/>
+              <a:t>(.)</a:t>
+            </a:r>
+          </a:p>
+          <a:p>
+            <a:r>
+              <a:rPr lang="es-ES" dirty="0" err="1"/>
+              <a:t>scipy.optimize.dual_annealing</a:t>
+            </a:r>
+            <a:r>
+              <a:rPr lang="es-ES" dirty="0"/>
+              <a:t>(.)</a:t>
+            </a:r>
+          </a:p>
+          <a:p>
+            <a:r>
+              <a:rPr lang="es-ES" dirty="0"/>
+              <a:t>…</a:t>
+            </a:r>
+          </a:p>
+          <a:p>
+            <a:endParaRPr lang="es-ES" dirty="0"/>
+          </a:p>
+          <a:p>
+            <a:endParaRPr lang="es-ES" dirty="0"/>
+          </a:p>
+          <a:p>
+            <a:endParaRPr lang="es-ES" dirty="0"/>
+          </a:p>
+          <a:p>
+            <a:endParaRPr lang="es-ES" b="1" dirty="0"/>
+          </a:p>
+        </p:txBody>
+      </p:sp>
+      <p:sp>
+        <p:nvSpPr>
+          <p:cNvPr id="7" name="CuadroTexto 6">
+            <a:extLst>
+              <a:ext uri="{FF2B5EF4-FFF2-40B4-BE49-F238E27FC236}">
+                <a16:creationId xmlns:a16="http://schemas.microsoft.com/office/drawing/2014/main" id="{09B6FDF7-54A0-436C-AD72-791E72DE6A55}"/>
+              </a:ext>
+            </a:extLst>
+          </p:cNvPr>
+          <p:cNvSpPr txBox="1"/>
+          <p:nvPr/>
+        </p:nvSpPr>
+        <p:spPr>
+          <a:xfrm>
+            <a:off x="0" y="4866501"/>
+            <a:ext cx="9161584" cy="276999"/>
+          </a:xfrm>
+          <a:prstGeom prst="rect">
+            <a:avLst/>
+          </a:prstGeom>
+          <a:noFill/>
+        </p:spPr>
+        <p:txBody>
+          <a:bodyPr wrap="square">
+            <a:spAutoFit/>
+          </a:bodyPr>
+          <a:lstStyle/>
+          <a:p>
+            <a:r>
+              <a:rPr lang="es-AR" sz="1200" i="1" dirty="0">
+                <a:hlinkClick r:id="rId4"/>
+              </a:rPr>
+              <a:t>https://docs.scipy.org/doc/scipy/reference/reference/optimize.html#module-scipy.optimize</a:t>
+            </a:r>
+            <a:r>
+              <a:rPr lang="es-AR" sz="1200" i="1" dirty="0"/>
+              <a:t> </a:t>
+            </a:r>
+          </a:p>
+        </p:txBody>
+      </p:sp>
+      <p:sp>
+        <p:nvSpPr>
+          <p:cNvPr id="8" name="CuadroTexto 7">
+            <a:extLst>
+              <a:ext uri="{FF2B5EF4-FFF2-40B4-BE49-F238E27FC236}">
+                <a16:creationId xmlns:a16="http://schemas.microsoft.com/office/drawing/2014/main" id="{B6E5C23A-8A02-4FD0-B5E7-39D98BC1FC77}"/>
+              </a:ext>
+            </a:extLst>
+          </p:cNvPr>
+          <p:cNvSpPr txBox="1"/>
+          <p:nvPr/>
+        </p:nvSpPr>
+        <p:spPr>
+          <a:xfrm>
+            <a:off x="4980968" y="1491190"/>
+            <a:ext cx="3147015" cy="523220"/>
+          </a:xfrm>
+          <a:prstGeom prst="rect">
+            <a:avLst/>
+          </a:prstGeom>
+          <a:noFill/>
+        </p:spPr>
+        <p:txBody>
+          <a:bodyPr wrap="none" rtlCol="0">
+            <a:spAutoFit/>
+          </a:bodyPr>
+          <a:lstStyle/>
+          <a:p>
+            <a:r>
+              <a:rPr lang="es-ES" dirty="0" err="1">
+                <a:solidFill>
+                  <a:srgbClr val="002060"/>
+                </a:solidFill>
+              </a:rPr>
+              <a:t>def</a:t>
+            </a:r>
+            <a:r>
+              <a:rPr lang="es-ES" dirty="0"/>
+              <a:t> CTE(q):</a:t>
+            </a:r>
+          </a:p>
+          <a:p>
+            <a:r>
+              <a:rPr lang="es-ES" dirty="0"/>
+              <a:t>      </a:t>
+            </a:r>
+            <a:r>
+              <a:rPr lang="es-ES" dirty="0" err="1">
+                <a:solidFill>
+                  <a:srgbClr val="7030A0"/>
+                </a:solidFill>
+              </a:rPr>
+              <a:t>return</a:t>
+            </a:r>
+            <a:r>
+              <a:rPr lang="es-ES" dirty="0">
+                <a:solidFill>
+                  <a:srgbClr val="7030A0"/>
+                </a:solidFill>
+              </a:rPr>
+              <a:t> </a:t>
+            </a:r>
+            <a:r>
+              <a:rPr lang="en-US" dirty="0"/>
+              <a:t>&lt;formula CTE(q) no lineal&gt;</a:t>
+            </a:r>
+            <a:endParaRPr lang="es-AR" dirty="0"/>
+          </a:p>
+        </p:txBody>
+      </p:sp>
+      <p:sp>
+        <p:nvSpPr>
+          <p:cNvPr id="18" name="CuadroTexto 17">
+            <a:extLst>
+              <a:ext uri="{FF2B5EF4-FFF2-40B4-BE49-F238E27FC236}">
+                <a16:creationId xmlns:a16="http://schemas.microsoft.com/office/drawing/2014/main" id="{5B627125-E62B-4989-AA06-AF9CD540EE7E}"/>
+              </a:ext>
+            </a:extLst>
+          </p:cNvPr>
+          <p:cNvSpPr txBox="1"/>
+          <p:nvPr/>
+        </p:nvSpPr>
+        <p:spPr>
+          <a:xfrm>
+            <a:off x="4976158" y="2224738"/>
+            <a:ext cx="4593980" cy="954107"/>
+          </a:xfrm>
+          <a:prstGeom prst="rect">
+            <a:avLst/>
+          </a:prstGeom>
+          <a:noFill/>
+        </p:spPr>
+        <p:txBody>
+          <a:bodyPr wrap="square">
+            <a:spAutoFit/>
+          </a:bodyPr>
+          <a:lstStyle/>
+          <a:p>
+            <a:r>
+              <a:rPr lang="es-AR" dirty="0"/>
+              <a:t>res = </a:t>
+            </a:r>
+            <a:r>
+              <a:rPr lang="es-AR" dirty="0" err="1"/>
+              <a:t>scipy.optimize.minimize</a:t>
+            </a:r>
+            <a:r>
+              <a:rPr lang="es-AR" dirty="0"/>
+              <a:t>(CTE, x0)</a:t>
+            </a:r>
+          </a:p>
+          <a:p>
+            <a:endParaRPr lang="es-AR" dirty="0"/>
+          </a:p>
+          <a:p>
+            <a:r>
+              <a:rPr lang="es-ES" dirty="0" err="1"/>
+              <a:t>cte_opt</a:t>
+            </a:r>
+            <a:r>
+              <a:rPr lang="es-ES" dirty="0"/>
+              <a:t> </a:t>
+            </a:r>
+            <a:r>
+              <a:rPr lang="en-US" dirty="0"/>
+              <a:t>= </a:t>
+            </a:r>
+            <a:r>
+              <a:rPr lang="es-AR" dirty="0" err="1"/>
+              <a:t>res.fun</a:t>
+            </a:r>
+            <a:endParaRPr lang="es-ES" dirty="0"/>
+          </a:p>
+          <a:p>
+            <a:r>
+              <a:rPr lang="es-ES" dirty="0" err="1"/>
+              <a:t>q_opt</a:t>
+            </a:r>
+            <a:r>
+              <a:rPr lang="es-ES" dirty="0"/>
+              <a:t> = </a:t>
+            </a:r>
+            <a:r>
+              <a:rPr lang="es-ES" dirty="0" err="1"/>
+              <a:t>res.x</a:t>
+            </a:r>
+            <a:endParaRPr lang="es-AR" dirty="0"/>
+          </a:p>
+        </p:txBody>
+      </p:sp>
+      <p:sp>
+        <p:nvSpPr>
+          <p:cNvPr id="15" name="CuadroTexto 14">
+            <a:extLst>
+              <a:ext uri="{FF2B5EF4-FFF2-40B4-BE49-F238E27FC236}">
+                <a16:creationId xmlns:a16="http://schemas.microsoft.com/office/drawing/2014/main" id="{F89CEF24-F301-4B98-ABA3-95D8D40352D8}"/>
+              </a:ext>
+            </a:extLst>
+          </p:cNvPr>
+          <p:cNvSpPr txBox="1"/>
+          <p:nvPr/>
+        </p:nvSpPr>
+        <p:spPr>
+          <a:xfrm>
+            <a:off x="4918167" y="3476349"/>
+            <a:ext cx="4062334" cy="523220"/>
+          </a:xfrm>
+          <a:prstGeom prst="rect">
+            <a:avLst/>
+          </a:prstGeom>
+          <a:noFill/>
+        </p:spPr>
+        <p:txBody>
+          <a:bodyPr wrap="square" rtlCol="0">
+            <a:spAutoFit/>
+          </a:bodyPr>
+          <a:lstStyle/>
+          <a:p>
+            <a:r>
+              <a:rPr lang="en-US" b="1" i="1" dirty="0" err="1"/>
+              <a:t>Desaf</a:t>
+            </a:r>
+            <a:r>
+              <a:rPr lang="es-ES" b="1" i="1" dirty="0" err="1"/>
+              <a:t>ío</a:t>
+            </a:r>
+            <a:r>
+              <a:rPr lang="es-ES" b="1" i="1" dirty="0"/>
+              <a:t>: </a:t>
+            </a:r>
+            <a:r>
+              <a:rPr lang="es-ES" i="1" dirty="0"/>
+              <a:t>Armar el problema visto en Python y optimizarlo con </a:t>
+            </a:r>
+            <a:r>
+              <a:rPr lang="es-ES" i="1" dirty="0" err="1"/>
+              <a:t>scipy.optimize.minimize</a:t>
+            </a:r>
+            <a:endParaRPr lang="es-AR" i="1" dirty="0"/>
+          </a:p>
+        </p:txBody>
+      </p:sp>
+    </p:spTree>
+    <p:extLst>
+      <p:ext uri="{BB962C8B-B14F-4D97-AF65-F5344CB8AC3E}">
+        <p14:creationId xmlns:p14="http://schemas.microsoft.com/office/powerpoint/2010/main" val="1286211302"/>
+      </p:ext>
+    </p:extLst>
+  </p:cSld>
+  <p:clrMapOvr>
+    <a:masterClrMapping/>
+  </p:clrMapOvr>
+  <p:timing>
+    <p:tnLst>
+      <p:par>
+        <p:cTn id="1" dur="indefinite" restart="never" nodeType="tmRoot">
+          <p:childTnLst>
+            <p:seq concurrent="1" nextAc="seek">
+              <p:cTn id="2" dur="indefinite" nodeType="mainSeq">
+                <p:childTnLst>
+                  <p:par>
+                    <p:cTn id="3" fill="hold">
+                      <p:stCondLst>
+                        <p:cond delay="indefinite"/>
+                      </p:stCondLst>
+                      <p:childTnLst>
+                        <p:par>
+                          <p:cTn id="4" fill="hold">
+                            <p:stCondLst>
+                              <p:cond delay="0"/>
+                            </p:stCondLst>
+                            <p:childTnLst>
+                              <p:par>
+                                <p:cTn id="5" presetID="10" presetClass="entr" presetSubtype="0" fill="hold" grpId="0" nodeType="clickEffect">
+                                  <p:stCondLst>
+                                    <p:cond delay="0"/>
+                                  </p:stCondLst>
+                                  <p:childTnLst>
+                                    <p:set>
+                                      <p:cBhvr>
+                                        <p:cTn id="6" dur="1" fill="hold">
+                                          <p:stCondLst>
+                                            <p:cond delay="0"/>
+                                          </p:stCondLst>
+                                        </p:cTn>
+                                        <p:tgtEl>
+                                          <p:spTgt spid="8"/>
+                                        </p:tgtEl>
+                                        <p:attrNameLst>
+                                          <p:attrName>style.visibility</p:attrName>
+                                        </p:attrNameLst>
+                                      </p:cBhvr>
+                                      <p:to>
+                                        <p:strVal val="visible"/>
+                                      </p:to>
+                                    </p:set>
+                                    <p:animEffect transition="in" filter="fade">
+                                      <p:cBhvr>
+                                        <p:cTn id="7" dur="500"/>
+                                        <p:tgtEl>
+                                          <p:spTgt spid="8"/>
+                                        </p:tgtEl>
+                                      </p:cBhvr>
+                                    </p:animEffect>
+                                  </p:childTnLst>
+                                </p:cTn>
+                              </p:par>
+                              <p:par>
+                                <p:cTn id="8" presetID="10" presetClass="entr" presetSubtype="0" fill="hold" grpId="0" nodeType="withEffect">
+                                  <p:stCondLst>
+                                    <p:cond delay="0"/>
+                                  </p:stCondLst>
+                                  <p:childTnLst>
+                                    <p:set>
+                                      <p:cBhvr>
+                                        <p:cTn id="9" dur="1" fill="hold">
+                                          <p:stCondLst>
+                                            <p:cond delay="0"/>
+                                          </p:stCondLst>
+                                        </p:cTn>
+                                        <p:tgtEl>
+                                          <p:spTgt spid="18"/>
+                                        </p:tgtEl>
+                                        <p:attrNameLst>
+                                          <p:attrName>style.visibility</p:attrName>
+                                        </p:attrNameLst>
+                                      </p:cBhvr>
+                                      <p:to>
+                                        <p:strVal val="visible"/>
+                                      </p:to>
+                                    </p:set>
+                                    <p:animEffect transition="in" filter="fade">
+                                      <p:cBhvr>
+                                        <p:cTn id="10" dur="500"/>
+                                        <p:tgtEl>
+                                          <p:spTgt spid="18"/>
+                                        </p:tgtEl>
+                                      </p:cBhvr>
+                                    </p:animEffect>
+                                  </p:childTnLst>
+                                </p:cTn>
+                              </p:par>
+                            </p:childTnLst>
+                          </p:cTn>
+                        </p:par>
+                      </p:childTnLst>
+                    </p:cTn>
+                  </p:par>
+                  <p:par>
+                    <p:cTn id="11" fill="hold">
+                      <p:stCondLst>
+                        <p:cond delay="indefinite"/>
+                      </p:stCondLst>
+                      <p:childTnLst>
+                        <p:par>
+                          <p:cTn id="12" fill="hold">
+                            <p:stCondLst>
+                              <p:cond delay="0"/>
+                            </p:stCondLst>
+                            <p:childTnLst>
+                              <p:par>
+                                <p:cTn id="13" presetID="10" presetClass="entr" presetSubtype="0" fill="hold" grpId="0" nodeType="clickEffect">
+                                  <p:stCondLst>
+                                    <p:cond delay="0"/>
+                                  </p:stCondLst>
+                                  <p:childTnLst>
+                                    <p:set>
+                                      <p:cBhvr>
+                                        <p:cTn id="14" dur="1" fill="hold">
+                                          <p:stCondLst>
+                                            <p:cond delay="0"/>
+                                          </p:stCondLst>
+                                        </p:cTn>
+                                        <p:tgtEl>
+                                          <p:spTgt spid="15"/>
+                                        </p:tgtEl>
+                                        <p:attrNameLst>
+                                          <p:attrName>style.visibility</p:attrName>
+                                        </p:attrNameLst>
+                                      </p:cBhvr>
+                                      <p:to>
+                                        <p:strVal val="visible"/>
+                                      </p:to>
+                                    </p:set>
+                                    <p:animEffect transition="in" filter="fade">
+                                      <p:cBhvr>
+                                        <p:cTn id="15" dur="500"/>
+                                        <p:tgtEl>
+                                          <p:spTgt spid="15"/>
+                                        </p:tgtEl>
+                                      </p:cBhvr>
+                                    </p:animEffect>
+                                  </p:childTnLst>
+                                </p:cTn>
+                              </p:par>
+                            </p:childTnLst>
+                          </p:cTn>
+                        </p:par>
+                      </p:childTnLst>
+                    </p:cTn>
+                  </p:par>
+                </p:childTnLst>
+              </p:cTn>
+              <p:prevCondLst>
+                <p:cond evt="onPrev" delay="0">
+                  <p:tgtEl>
+                    <p:sldTgt/>
+                  </p:tgtEl>
+                </p:cond>
+              </p:prevCondLst>
+              <p:nextCondLst>
+                <p:cond evt="onNext" delay="0">
+                  <p:tgtEl>
+                    <p:sldTgt/>
+                  </p:tgtEl>
+                </p:cond>
+              </p:nextCondLst>
+            </p:seq>
+          </p:childTnLst>
+        </p:cTn>
+      </p:par>
+    </p:tnLst>
+    <p:bldLst>
+      <p:bldP spid="8" grpId="0"/>
+      <p:bldP spid="18" grpId="0"/>
+      <p:bldP spid="15" grpId="0"/>
+    </p:bldLst>
+  </p:timing>
+</p:sld>
+</file>
+
 <file path=ppt/slides/slide2.xml><?xml version="1.0" encoding="utf-8"?>
 <p:sld xmlns:a="http://schemas.openxmlformats.org/drawingml/2006/main" xmlns:r="http://schemas.openxmlformats.org/officeDocument/2006/relationships" xmlns:p="http://schemas.openxmlformats.org/presentationml/2006/main">
   <p:cSld>
@@ -25372,7 +26041,7 @@
             </a:r>
             <a:r>
               <a:rPr lang="en-US" sz="1500" dirty="0" err="1"/>
-              <a:t>siguintes</a:t>
+              <a:t>siguientes</a:t>
             </a:r>
             <a:r>
               <a:rPr lang="en-US" sz="1500" dirty="0"/>
@@ -34384,73 +35053,6 @@
           <a:chExt cx="0" cy="0"/>
         </a:xfrm>
       </p:grpSpPr>
-      <p:sp>
-        <p:nvSpPr>
-          <p:cNvPr id="43" name="Google Shape;43;p9"/>
-          <p:cNvSpPr txBox="1">
-            <a:spLocks noGrp="1"/>
-          </p:cNvSpPr>
-          <p:nvPr>
-            <p:ph type="title"/>
-          </p:nvPr>
-        </p:nvSpPr>
-        <p:spPr>
-          <a:xfrm>
-            <a:off x="0" y="0"/>
-            <a:ext cx="3409122" cy="616226"/>
-          </a:xfrm>
-          <a:prstGeom prst="rect">
-            <a:avLst/>
-          </a:prstGeom>
-          <a:noFill/>
-          <a:ln>
-            <a:noFill/>
-          </a:ln>
-        </p:spPr>
-        <p:txBody>
-          <a:bodyPr spcFirstLastPara="1" wrap="square" lIns="91425" tIns="91425" rIns="91425" bIns="91425" anchor="b" anchorCtr="0">
-            <a:noAutofit/>
-          </a:bodyPr>
-          <a:lstStyle/>
-          <a:p>
-            <a:pPr marL="0" marR="0" lvl="0" indent="0" algn="l" rtl="0">
-              <a:lnSpc>
-                <a:spcPct val="100000"/>
-              </a:lnSpc>
-              <a:spcBef>
-                <a:spcPts val="0"/>
-              </a:spcBef>
-              <a:spcAft>
-                <a:spcPts val="0"/>
-              </a:spcAft>
-              <a:buClr>
-                <a:schemeClr val="lt1"/>
-              </a:buClr>
-              <a:buSzPts val="1400"/>
-              <a:buFont typeface="Arial"/>
-              <a:buNone/>
-            </a:pPr>
-            <a:r>
-              <a:rPr lang="es-AR" sz="3200" dirty="0">
-                <a:latin typeface="Helvetica Neue"/>
-                <a:ea typeface="Helvetica Neue"/>
-                <a:cs typeface="Helvetica Neue"/>
-                <a:sym typeface="Helvetica Neue"/>
-              </a:rPr>
-              <a:t>Visualización</a:t>
-            </a:r>
-            <a:endParaRPr sz="3200" i="0" u="none" strike="noStrike" cap="none" dirty="0">
-              <a:solidFill>
-                <a:schemeClr val="lt1"/>
-              </a:solidFill>
-              <a:latin typeface="Helvetica Neue"/>
-              <a:ea typeface="Helvetica Neue"/>
-              <a:cs typeface="Helvetica Neue"/>
-              <a:sym typeface="Helvetica Neue"/>
-            </a:endParaRPr>
-          </a:p>
-        </p:txBody>
-      </p:sp>
       <mc:AlternateContent xmlns:mc="http://schemas.openxmlformats.org/markup-compatibility/2006" xmlns:a14="http://schemas.microsoft.com/office/drawing/2010/main">
         <mc:Choice Requires="a14">
           <p:graphicFrame>
@@ -38003,73 +38605,6 @@
           <a:chExt cx="0" cy="0"/>
         </a:xfrm>
       </p:grpSpPr>
-      <p:sp>
-        <p:nvSpPr>
-          <p:cNvPr id="43" name="Google Shape;43;p9"/>
-          <p:cNvSpPr txBox="1">
-            <a:spLocks noGrp="1"/>
-          </p:cNvSpPr>
-          <p:nvPr>
-            <p:ph type="title"/>
-          </p:nvPr>
-        </p:nvSpPr>
-        <p:spPr>
-          <a:xfrm>
-            <a:off x="0" y="0"/>
-            <a:ext cx="3409122" cy="616226"/>
-          </a:xfrm>
-          <a:prstGeom prst="rect">
-            <a:avLst/>
-          </a:prstGeom>
-          <a:noFill/>
-          <a:ln>
-            <a:noFill/>
-          </a:ln>
-        </p:spPr>
-        <p:txBody>
-          <a:bodyPr spcFirstLastPara="1" wrap="square" lIns="91425" tIns="91425" rIns="91425" bIns="91425" anchor="b" anchorCtr="0">
-            <a:noAutofit/>
-          </a:bodyPr>
-          <a:lstStyle/>
-          <a:p>
-            <a:pPr marL="0" marR="0" lvl="0" indent="0" algn="l" rtl="0">
-              <a:lnSpc>
-                <a:spcPct val="100000"/>
-              </a:lnSpc>
-              <a:spcBef>
-                <a:spcPts val="0"/>
-              </a:spcBef>
-              <a:spcAft>
-                <a:spcPts val="0"/>
-              </a:spcAft>
-              <a:buClr>
-                <a:schemeClr val="lt1"/>
-              </a:buClr>
-              <a:buSzPts val="1400"/>
-              <a:buFont typeface="Arial"/>
-              <a:buNone/>
-            </a:pPr>
-            <a:r>
-              <a:rPr lang="es-AR" sz="3200" dirty="0">
-                <a:latin typeface="Helvetica Neue"/>
-                <a:ea typeface="Helvetica Neue"/>
-                <a:cs typeface="Helvetica Neue"/>
-                <a:sym typeface="Helvetica Neue"/>
-              </a:rPr>
-              <a:t>Visualización</a:t>
-            </a:r>
-            <a:endParaRPr sz="3200" i="0" u="none" strike="noStrike" cap="none" dirty="0">
-              <a:solidFill>
-                <a:schemeClr val="lt1"/>
-              </a:solidFill>
-              <a:latin typeface="Helvetica Neue"/>
-              <a:ea typeface="Helvetica Neue"/>
-              <a:cs typeface="Helvetica Neue"/>
-              <a:sym typeface="Helvetica Neue"/>
-            </a:endParaRPr>
-          </a:p>
-        </p:txBody>
-      </p:sp>
       <mc:AlternateContent xmlns:mc="http://schemas.openxmlformats.org/markup-compatibility/2006" xmlns:a14="http://schemas.microsoft.com/office/drawing/2010/main">
         <mc:Choice Requires="a14">
           <p:graphicFrame>

</xml_diff>